<commit_message>
Update Bloc 1 - Euler
</commit_message>
<xml_diff>
--- a/s5_outils_numeriques/b1_outils_numeriques/seance1_demistifier_python/B1_0_Deroulement.pptx
+++ b/s5_outils_numeriques/b1_outils_numeriques/seance1_demistifier_python/B1_0_Deroulement.pptx
@@ -9,6 +9,7 @@
     <p:sldId id="272" r:id="rId3"/>
     <p:sldId id="273" r:id="rId4"/>
     <p:sldId id="274" r:id="rId5"/>
+    <p:sldId id="275" r:id="rId6"/>
   </p:sldIdLst>
   <p:sldSz cx="12192000" cy="6858000"/>
   <p:notesSz cx="6858000" cy="9144000"/>
@@ -8226,7 +8227,7 @@
           <a:p>
             <a:r>
               <a:rPr lang="fr-FR" sz="1600" dirty="0"/>
-              <a:t>30’</a:t>
+              <a:t>25’</a:t>
             </a:r>
           </a:p>
         </p:txBody>
@@ -8266,7 +8267,7 @@
           <a:p>
             <a:r>
               <a:rPr lang="fr-FR" sz="1600" dirty="0"/>
-              <a:t>B1_s1_ex01_bases</a:t>
+              <a:t>B1_s2_ex21_x_sympy</a:t>
             </a:r>
           </a:p>
         </p:txBody>
@@ -8285,17 +8286,14 @@
         </p:nvSpPr>
         <p:spPr>
           <a:xfrm>
-            <a:off x="727188" y="4218039"/>
-            <a:ext cx="2035677" cy="338554"/>
-          </a:xfrm>
-          <a:prstGeom prst="rect">
-            <a:avLst/>
-          </a:prstGeom>
-          <a:solidFill>
-            <a:schemeClr val="tx2">
-              <a:lumMod val="10000"/>
-              <a:lumOff val="90000"/>
-            </a:schemeClr>
+            <a:off x="717749" y="4213684"/>
+            <a:ext cx="2045115" cy="338554"/>
+          </a:xfrm>
+          <a:prstGeom prst="rect">
+            <a:avLst/>
+          </a:prstGeom>
+          <a:solidFill>
+            <a:srgbClr val="00B050"/>
           </a:solidFill>
         </p:spPr>
         <p:txBody>
@@ -8305,8 +8303,12 @@
           <a:lstStyle/>
           <a:p>
             <a:r>
+              <a:rPr lang="fr-FR" sz="1600" dirty="0" err="1"/>
+              <a:t>Résol</a:t>
+            </a:r>
+            <a:r>
               <a:rPr lang="fr-FR" sz="1600" dirty="0"/>
-              <a:t>Typage Données</a:t>
+              <a:t>. Problème 1</a:t>
             </a:r>
           </a:p>
         </p:txBody>
@@ -8325,17 +8327,14 @@
         </p:nvSpPr>
         <p:spPr>
           <a:xfrm>
-            <a:off x="2841320" y="4213684"/>
+            <a:off x="2831882" y="4204974"/>
             <a:ext cx="540977" cy="338554"/>
           </a:xfrm>
           <a:prstGeom prst="rect">
             <a:avLst/>
           </a:prstGeom>
           <a:solidFill>
-            <a:schemeClr val="tx2">
-              <a:lumMod val="10000"/>
-              <a:lumOff val="90000"/>
-            </a:schemeClr>
+            <a:srgbClr val="00B050"/>
           </a:solidFill>
           <a:ln>
             <a:solidFill>
@@ -8351,17 +8350,56 @@
           <a:p>
             <a:r>
               <a:rPr lang="fr-FR" sz="1600" dirty="0"/>
-              <a:t>10’</a:t>
-            </a:r>
-          </a:p>
-        </p:txBody>
-      </p:sp>
-      <p:sp>
-        <p:nvSpPr>
-          <p:cNvPr id="25" name="ZoneTexte 24">
-            <a:extLst>
-              <a:ext uri="{FF2B5EF4-FFF2-40B4-BE49-F238E27FC236}">
-                <a16:creationId xmlns:a16="http://schemas.microsoft.com/office/drawing/2014/main" id="{41CD3BE3-79DA-A850-32BE-6A35B8A46573}"/>
+              <a:t>30’</a:t>
+            </a:r>
+          </a:p>
+        </p:txBody>
+      </p:sp>
+      <p:pic>
+        <p:nvPicPr>
+          <p:cNvPr id="3" name="Graphique 2" descr="Flèches de chevron avec un remplissage uni">
+            <a:extLst>
+              <a:ext uri="{FF2B5EF4-FFF2-40B4-BE49-F238E27FC236}">
+                <a16:creationId xmlns:a16="http://schemas.microsoft.com/office/drawing/2014/main" id="{83030DF5-3598-5C00-02BC-7BE515ABC369}"/>
+              </a:ext>
+            </a:extLst>
+          </p:cNvPr>
+          <p:cNvPicPr>
+            <a:picLocks noChangeAspect="1"/>
+          </p:cNvPicPr>
+          <p:nvPr/>
+        </p:nvPicPr>
+        <p:blipFill>
+          <a:blip r:embed="rId3">
+            <a:extLst>
+              <a:ext uri="{28A0092B-C50C-407E-A947-70E740481C1C}">
+                <a14:useLocalDpi xmlns:a14="http://schemas.microsoft.com/office/drawing/2010/main" val="0"/>
+              </a:ext>
+              <a:ext uri="{96DAC541-7B7A-43D3-8B79-37D633B846F1}">
+                <asvg:svgBlip xmlns:asvg="http://schemas.microsoft.com/office/drawing/2016/SVG/main" r:embed="rId4"/>
+              </a:ext>
+            </a:extLst>
+          </a:blip>
+          <a:stretch>
+            <a:fillRect/>
+          </a:stretch>
+        </p:blipFill>
+        <p:spPr>
+          <a:xfrm>
+            <a:off x="95273" y="4100187"/>
+            <a:ext cx="565548" cy="565548"/>
+          </a:xfrm>
+          <a:prstGeom prst="rect">
+            <a:avLst/>
+          </a:prstGeom>
+        </p:spPr>
+      </p:pic>
+      <p:sp>
+        <p:nvSpPr>
+          <p:cNvPr id="4" name="ZoneTexte 3">
+            <a:extLst>
+              <a:ext uri="{FF2B5EF4-FFF2-40B4-BE49-F238E27FC236}">
+                <a16:creationId xmlns:a16="http://schemas.microsoft.com/office/drawing/2014/main" id="{08574BBD-ED23-52A8-47C4-7CA3E77D6A40}"/>
               </a:ext>
             </a:extLst>
           </p:cNvPr>
@@ -8370,8 +8408,8 @@
         </p:nvSpPr>
         <p:spPr>
           <a:xfrm>
-            <a:off x="3515032" y="4213684"/>
-            <a:ext cx="2389239" cy="338554"/>
+            <a:off x="717749" y="4625199"/>
+            <a:ext cx="2045115" cy="338554"/>
           </a:xfrm>
           <a:prstGeom prst="rect">
             <a:avLst/>
@@ -8391,15 +8429,1483 @@
           <a:p>
             <a:r>
               <a:rPr lang="fr-FR" sz="1600" dirty="0"/>
-              <a:t>B1_s1_ex02_typage</a:t>
-            </a:r>
-          </a:p>
-        </p:txBody>
-      </p:sp>
+              <a:t>Retour Problème 1</a:t>
+            </a:r>
+          </a:p>
+        </p:txBody>
+      </p:sp>
+      <p:sp>
+        <p:nvSpPr>
+          <p:cNvPr id="7" name="ZoneTexte 6">
+            <a:extLst>
+              <a:ext uri="{FF2B5EF4-FFF2-40B4-BE49-F238E27FC236}">
+                <a16:creationId xmlns:a16="http://schemas.microsoft.com/office/drawing/2014/main" id="{BDB91F2A-561A-43D9-BCBE-77619CB6D9B1}"/>
+              </a:ext>
+            </a:extLst>
+          </p:cNvPr>
+          <p:cNvSpPr txBox="1"/>
+          <p:nvPr/>
+        </p:nvSpPr>
+        <p:spPr>
+          <a:xfrm>
+            <a:off x="2819792" y="4617957"/>
+            <a:ext cx="550415" cy="338554"/>
+          </a:xfrm>
+          <a:prstGeom prst="rect">
+            <a:avLst/>
+          </a:prstGeom>
+          <a:solidFill>
+            <a:schemeClr val="tx2">
+              <a:lumMod val="10000"/>
+              <a:lumOff val="90000"/>
+            </a:schemeClr>
+          </a:solidFill>
+          <a:ln>
+            <a:solidFill>
+              <a:schemeClr val="bg1"/>
+            </a:solidFill>
+          </a:ln>
+        </p:spPr>
+        <p:txBody>
+          <a:bodyPr wrap="square">
+            <a:spAutoFit/>
+          </a:bodyPr>
+          <a:lstStyle/>
+          <a:p>
+            <a:r>
+              <a:rPr lang="fr-FR" sz="1600" dirty="0"/>
+              <a:t>10’</a:t>
+            </a:r>
+          </a:p>
+        </p:txBody>
+      </p:sp>
+      <p:sp>
+        <p:nvSpPr>
+          <p:cNvPr id="9" name="ZoneTexte 8">
+            <a:extLst>
+              <a:ext uri="{FF2B5EF4-FFF2-40B4-BE49-F238E27FC236}">
+                <a16:creationId xmlns:a16="http://schemas.microsoft.com/office/drawing/2014/main" id="{DFB254CD-06FC-814E-F448-B4F6D26CE367}"/>
+              </a:ext>
+            </a:extLst>
+          </p:cNvPr>
+          <p:cNvSpPr txBox="1"/>
+          <p:nvPr/>
+        </p:nvSpPr>
+        <p:spPr>
+          <a:xfrm>
+            <a:off x="717749" y="5148017"/>
+            <a:ext cx="2045115" cy="338554"/>
+          </a:xfrm>
+          <a:prstGeom prst="rect">
+            <a:avLst/>
+          </a:prstGeom>
+          <a:solidFill>
+            <a:srgbClr val="00B050"/>
+          </a:solidFill>
+        </p:spPr>
+        <p:txBody>
+          <a:bodyPr wrap="square">
+            <a:spAutoFit/>
+          </a:bodyPr>
+          <a:lstStyle/>
+          <a:p>
+            <a:r>
+              <a:rPr lang="fr-FR" sz="1600" dirty="0" err="1"/>
+              <a:t>Optim</a:t>
+            </a:r>
+            <a:r>
+              <a:rPr lang="fr-FR" sz="1600" dirty="0"/>
+              <a:t>. Problème 1</a:t>
+            </a:r>
+          </a:p>
+        </p:txBody>
+      </p:sp>
+      <p:sp>
+        <p:nvSpPr>
+          <p:cNvPr id="10" name="ZoneTexte 9">
+            <a:extLst>
+              <a:ext uri="{FF2B5EF4-FFF2-40B4-BE49-F238E27FC236}">
+                <a16:creationId xmlns:a16="http://schemas.microsoft.com/office/drawing/2014/main" id="{45668154-8B71-49F5-882F-C0936268B202}"/>
+              </a:ext>
+            </a:extLst>
+          </p:cNvPr>
+          <p:cNvSpPr txBox="1"/>
+          <p:nvPr/>
+        </p:nvSpPr>
+        <p:spPr>
+          <a:xfrm>
+            <a:off x="2831882" y="5139307"/>
+            <a:ext cx="540977" cy="338554"/>
+          </a:xfrm>
+          <a:prstGeom prst="rect">
+            <a:avLst/>
+          </a:prstGeom>
+          <a:solidFill>
+            <a:srgbClr val="00B050"/>
+          </a:solidFill>
+          <a:ln>
+            <a:solidFill>
+              <a:schemeClr val="bg1"/>
+            </a:solidFill>
+          </a:ln>
+        </p:spPr>
+        <p:txBody>
+          <a:bodyPr wrap="square">
+            <a:spAutoFit/>
+          </a:bodyPr>
+          <a:lstStyle/>
+          <a:p>
+            <a:r>
+              <a:rPr lang="fr-FR" sz="1600" dirty="0"/>
+              <a:t>30’</a:t>
+            </a:r>
+          </a:p>
+        </p:txBody>
+      </p:sp>
+      <p:pic>
+        <p:nvPicPr>
+          <p:cNvPr id="11" name="Graphique 10" descr="Flèches de chevron avec un remplissage uni">
+            <a:extLst>
+              <a:ext uri="{FF2B5EF4-FFF2-40B4-BE49-F238E27FC236}">
+                <a16:creationId xmlns:a16="http://schemas.microsoft.com/office/drawing/2014/main" id="{478177A1-EC28-2ACC-8B1B-8C2D256A9557}"/>
+              </a:ext>
+            </a:extLst>
+          </p:cNvPr>
+          <p:cNvPicPr>
+            <a:picLocks noChangeAspect="1"/>
+          </p:cNvPicPr>
+          <p:nvPr/>
+        </p:nvPicPr>
+        <p:blipFill>
+          <a:blip r:embed="rId3">
+            <a:extLst>
+              <a:ext uri="{28A0092B-C50C-407E-A947-70E740481C1C}">
+                <a14:useLocalDpi xmlns:a14="http://schemas.microsoft.com/office/drawing/2010/main" val="0"/>
+              </a:ext>
+              <a:ext uri="{96DAC541-7B7A-43D3-8B79-37D633B846F1}">
+                <asvg:svgBlip xmlns:asvg="http://schemas.microsoft.com/office/drawing/2016/SVG/main" r:embed="rId4"/>
+              </a:ext>
+            </a:extLst>
+          </a:blip>
+          <a:stretch>
+            <a:fillRect/>
+          </a:stretch>
+        </p:blipFill>
+        <p:spPr>
+          <a:xfrm>
+            <a:off x="95273" y="5034520"/>
+            <a:ext cx="565548" cy="565548"/>
+          </a:xfrm>
+          <a:prstGeom prst="rect">
+            <a:avLst/>
+          </a:prstGeom>
+        </p:spPr>
+      </p:pic>
+      <p:sp>
+        <p:nvSpPr>
+          <p:cNvPr id="12" name="ZoneTexte 11">
+            <a:extLst>
+              <a:ext uri="{FF2B5EF4-FFF2-40B4-BE49-F238E27FC236}">
+                <a16:creationId xmlns:a16="http://schemas.microsoft.com/office/drawing/2014/main" id="{09B575F7-7753-5261-56D2-2B6983DDC110}"/>
+              </a:ext>
+            </a:extLst>
+          </p:cNvPr>
+          <p:cNvSpPr txBox="1"/>
+          <p:nvPr/>
+        </p:nvSpPr>
+        <p:spPr>
+          <a:xfrm>
+            <a:off x="6681015" y="3875130"/>
+            <a:ext cx="2045115" cy="338554"/>
+          </a:xfrm>
+          <a:prstGeom prst="rect">
+            <a:avLst/>
+          </a:prstGeom>
+          <a:solidFill>
+            <a:schemeClr val="tx2">
+              <a:lumMod val="10000"/>
+              <a:lumOff val="90000"/>
+            </a:schemeClr>
+          </a:solidFill>
+          <a:ln>
+            <a:solidFill>
+              <a:schemeClr val="bg1"/>
+            </a:solidFill>
+          </a:ln>
+        </p:spPr>
+        <p:txBody>
+          <a:bodyPr wrap="square">
+            <a:spAutoFit/>
+          </a:bodyPr>
+          <a:lstStyle/>
+          <a:p>
+            <a:r>
+              <a:rPr lang="fr-FR" sz="1600" dirty="0"/>
+              <a:t>Intégration </a:t>
+            </a:r>
+            <a:r>
+              <a:rPr lang="fr-FR" sz="1600" dirty="0" err="1"/>
+              <a:t>Num</a:t>
+            </a:r>
+            <a:r>
+              <a:rPr lang="fr-FR" sz="1600" dirty="0"/>
+              <a:t>.</a:t>
+            </a:r>
+          </a:p>
+        </p:txBody>
+      </p:sp>
+      <p:sp>
+        <p:nvSpPr>
+          <p:cNvPr id="13" name="ZoneTexte 12">
+            <a:extLst>
+              <a:ext uri="{FF2B5EF4-FFF2-40B4-BE49-F238E27FC236}">
+                <a16:creationId xmlns:a16="http://schemas.microsoft.com/office/drawing/2014/main" id="{1AC6035A-5AD2-BBBC-F783-2EF37EABB0BB}"/>
+              </a:ext>
+            </a:extLst>
+          </p:cNvPr>
+          <p:cNvSpPr txBox="1"/>
+          <p:nvPr/>
+        </p:nvSpPr>
+        <p:spPr>
+          <a:xfrm>
+            <a:off x="8795147" y="3875130"/>
+            <a:ext cx="550415" cy="338554"/>
+          </a:xfrm>
+          <a:prstGeom prst="rect">
+            <a:avLst/>
+          </a:prstGeom>
+          <a:solidFill>
+            <a:schemeClr val="tx2">
+              <a:lumMod val="10000"/>
+              <a:lumOff val="90000"/>
+            </a:schemeClr>
+          </a:solidFill>
+          <a:ln>
+            <a:solidFill>
+              <a:schemeClr val="bg1"/>
+            </a:solidFill>
+          </a:ln>
+        </p:spPr>
+        <p:txBody>
+          <a:bodyPr wrap="square">
+            <a:spAutoFit/>
+          </a:bodyPr>
+          <a:lstStyle/>
+          <a:p>
+            <a:r>
+              <a:rPr lang="fr-FR" sz="1600" dirty="0"/>
+              <a:t>15’</a:t>
+            </a:r>
+          </a:p>
+        </p:txBody>
+      </p:sp>
+      <p:sp>
+        <p:nvSpPr>
+          <p:cNvPr id="14" name="CustomShape 3">
+            <a:extLst>
+              <a:ext uri="{FF2B5EF4-FFF2-40B4-BE49-F238E27FC236}">
+                <a16:creationId xmlns:a16="http://schemas.microsoft.com/office/drawing/2014/main" id="{2FC6536D-2438-C28D-25C9-8FC94468299F}"/>
+              </a:ext>
+            </a:extLst>
+          </p:cNvPr>
+          <p:cNvSpPr/>
+          <p:nvPr/>
+        </p:nvSpPr>
+        <p:spPr>
+          <a:xfrm>
+            <a:off x="6545025" y="3365459"/>
+            <a:ext cx="1461845" cy="430887"/>
+          </a:xfrm>
+          <a:prstGeom prst="rect">
+            <a:avLst/>
+          </a:prstGeom>
+          <a:solidFill>
+            <a:schemeClr val="accent2">
+              <a:lumMod val="75000"/>
+            </a:schemeClr>
+          </a:solidFill>
+          <a:ln w="0">
+            <a:noFill/>
+          </a:ln>
+        </p:spPr>
+        <p:style>
+          <a:lnRef idx="0">
+            <a:scrgbClr r="0" g="0" b="0"/>
+          </a:lnRef>
+          <a:fillRef idx="0">
+            <a:scrgbClr r="0" g="0" b="0"/>
+          </a:fillRef>
+          <a:effectRef idx="0">
+            <a:scrgbClr r="0" g="0" b="0"/>
+          </a:effectRef>
+          <a:fontRef idx="minor"/>
+        </p:style>
+        <p:txBody>
+          <a:bodyPr wrap="square" tIns="91440" bIns="91440">
+            <a:spAutoFit/>
+          </a:bodyPr>
+          <a:lstStyle/>
+          <a:p>
+            <a:pPr algn="ctr">
+              <a:lnSpc>
+                <a:spcPct val="100000"/>
+              </a:lnSpc>
+              <a:tabLst>
+                <a:tab pos="0" algn="l"/>
+              </a:tabLst>
+            </a:pPr>
+            <a:r>
+              <a:rPr lang="fr-FR" sz="1600" b="1" spc="-1" dirty="0">
+                <a:solidFill>
+                  <a:schemeClr val="bg1"/>
+                </a:solidFill>
+                <a:latin typeface="Trebuchet MS"/>
+              </a:rPr>
+              <a:t>Séance 3</a:t>
+            </a:r>
+            <a:endParaRPr lang="fr-FR" sz="1600" b="0" strike="noStrike" spc="-1" dirty="0">
+              <a:solidFill>
+                <a:schemeClr val="bg1"/>
+              </a:solidFill>
+              <a:latin typeface="Arial"/>
+            </a:endParaRPr>
+          </a:p>
+        </p:txBody>
+      </p:sp>
+      <p:sp>
+        <p:nvSpPr>
+          <p:cNvPr id="15" name="ZoneTexte 14">
+            <a:extLst>
+              <a:ext uri="{FF2B5EF4-FFF2-40B4-BE49-F238E27FC236}">
+                <a16:creationId xmlns:a16="http://schemas.microsoft.com/office/drawing/2014/main" id="{6350729A-8E45-4791-72DA-F27A5340C5FE}"/>
+              </a:ext>
+            </a:extLst>
+          </p:cNvPr>
+          <p:cNvSpPr txBox="1"/>
+          <p:nvPr/>
+        </p:nvSpPr>
+        <p:spPr>
+          <a:xfrm>
+            <a:off x="9468858" y="3866420"/>
+            <a:ext cx="2389239" cy="338554"/>
+          </a:xfrm>
+          <a:prstGeom prst="rect">
+            <a:avLst/>
+          </a:prstGeom>
+          <a:solidFill>
+            <a:schemeClr val="tx2">
+              <a:lumMod val="10000"/>
+              <a:lumOff val="90000"/>
+            </a:schemeClr>
+          </a:solidFill>
+        </p:spPr>
+        <p:txBody>
+          <a:bodyPr wrap="square">
+            <a:spAutoFit/>
+          </a:bodyPr>
+          <a:lstStyle/>
+          <a:p>
+            <a:r>
+              <a:rPr lang="fr-FR" sz="1600" dirty="0"/>
+              <a:t>B1_s3_ex31_euler</a:t>
+            </a:r>
+          </a:p>
+        </p:txBody>
+      </p:sp>
+      <p:sp>
+        <p:nvSpPr>
+          <p:cNvPr id="37" name="ZoneTexte 36">
+            <a:extLst>
+              <a:ext uri="{FF2B5EF4-FFF2-40B4-BE49-F238E27FC236}">
+                <a16:creationId xmlns:a16="http://schemas.microsoft.com/office/drawing/2014/main" id="{A260787C-5F6D-33E3-CF87-1E79867D1239}"/>
+              </a:ext>
+            </a:extLst>
+          </p:cNvPr>
+          <p:cNvSpPr txBox="1"/>
+          <p:nvPr/>
+        </p:nvSpPr>
+        <p:spPr>
+          <a:xfrm>
+            <a:off x="6675319" y="4286645"/>
+            <a:ext cx="2045115" cy="338554"/>
+          </a:xfrm>
+          <a:prstGeom prst="rect">
+            <a:avLst/>
+          </a:prstGeom>
+          <a:solidFill>
+            <a:srgbClr val="00B050"/>
+          </a:solidFill>
+        </p:spPr>
+        <p:txBody>
+          <a:bodyPr wrap="square">
+            <a:spAutoFit/>
+          </a:bodyPr>
+          <a:lstStyle/>
+          <a:p>
+            <a:r>
+              <a:rPr lang="fr-FR" sz="1600" dirty="0" err="1"/>
+              <a:t>Résol</a:t>
+            </a:r>
+            <a:r>
+              <a:rPr lang="fr-FR" sz="1600" dirty="0"/>
+              <a:t>. Problème 2</a:t>
+            </a:r>
+          </a:p>
+        </p:txBody>
+      </p:sp>
+      <p:sp>
+        <p:nvSpPr>
+          <p:cNvPr id="38" name="ZoneTexte 37">
+            <a:extLst>
+              <a:ext uri="{FF2B5EF4-FFF2-40B4-BE49-F238E27FC236}">
+                <a16:creationId xmlns:a16="http://schemas.microsoft.com/office/drawing/2014/main" id="{FB3BD359-9A77-7327-DD52-02172CD73660}"/>
+              </a:ext>
+            </a:extLst>
+          </p:cNvPr>
+          <p:cNvSpPr txBox="1"/>
+          <p:nvPr/>
+        </p:nvSpPr>
+        <p:spPr>
+          <a:xfrm>
+            <a:off x="8800718" y="4286645"/>
+            <a:ext cx="540977" cy="338554"/>
+          </a:xfrm>
+          <a:prstGeom prst="rect">
+            <a:avLst/>
+          </a:prstGeom>
+          <a:solidFill>
+            <a:srgbClr val="00B050"/>
+          </a:solidFill>
+          <a:ln>
+            <a:solidFill>
+              <a:schemeClr val="bg1"/>
+            </a:solidFill>
+          </a:ln>
+        </p:spPr>
+        <p:txBody>
+          <a:bodyPr wrap="square">
+            <a:spAutoFit/>
+          </a:bodyPr>
+          <a:lstStyle/>
+          <a:p>
+            <a:r>
+              <a:rPr lang="fr-FR" sz="1600" dirty="0"/>
+              <a:t>30’</a:t>
+            </a:r>
+          </a:p>
+        </p:txBody>
+      </p:sp>
+      <p:pic>
+        <p:nvPicPr>
+          <p:cNvPr id="39" name="Graphique 38" descr="Flèches de chevron avec un remplissage uni">
+            <a:extLst>
+              <a:ext uri="{FF2B5EF4-FFF2-40B4-BE49-F238E27FC236}">
+                <a16:creationId xmlns:a16="http://schemas.microsoft.com/office/drawing/2014/main" id="{8220E097-EDBF-E3ED-377D-7329677F61ED}"/>
+              </a:ext>
+            </a:extLst>
+          </p:cNvPr>
+          <p:cNvPicPr>
+            <a:picLocks noChangeAspect="1"/>
+          </p:cNvPicPr>
+          <p:nvPr/>
+        </p:nvPicPr>
+        <p:blipFill>
+          <a:blip r:embed="rId3">
+            <a:extLst>
+              <a:ext uri="{28A0092B-C50C-407E-A947-70E740481C1C}">
+                <a14:useLocalDpi xmlns:a14="http://schemas.microsoft.com/office/drawing/2010/main" val="0"/>
+              </a:ext>
+              <a:ext uri="{96DAC541-7B7A-43D3-8B79-37D633B846F1}">
+                <asvg:svgBlip xmlns:asvg="http://schemas.microsoft.com/office/drawing/2016/SVG/main" r:embed="rId4"/>
+              </a:ext>
+            </a:extLst>
+          </a:blip>
+          <a:stretch>
+            <a:fillRect/>
+          </a:stretch>
+        </p:blipFill>
+        <p:spPr>
+          <a:xfrm>
+            <a:off x="6067976" y="4173148"/>
+            <a:ext cx="565548" cy="565548"/>
+          </a:xfrm>
+          <a:prstGeom prst="rect">
+            <a:avLst/>
+          </a:prstGeom>
+        </p:spPr>
+      </p:pic>
+      <p:sp>
+        <p:nvSpPr>
+          <p:cNvPr id="40" name="ZoneTexte 39">
+            <a:extLst>
+              <a:ext uri="{FF2B5EF4-FFF2-40B4-BE49-F238E27FC236}">
+                <a16:creationId xmlns:a16="http://schemas.microsoft.com/office/drawing/2014/main" id="{E32A052A-4DB6-54BF-24C9-55669F1967FD}"/>
+              </a:ext>
+            </a:extLst>
+          </p:cNvPr>
+          <p:cNvSpPr txBox="1"/>
+          <p:nvPr/>
+        </p:nvSpPr>
+        <p:spPr>
+          <a:xfrm>
+            <a:off x="6675319" y="4694700"/>
+            <a:ext cx="2045115" cy="338554"/>
+          </a:xfrm>
+          <a:prstGeom prst="rect">
+            <a:avLst/>
+          </a:prstGeom>
+          <a:solidFill>
+            <a:schemeClr val="tx2">
+              <a:lumMod val="10000"/>
+              <a:lumOff val="90000"/>
+            </a:schemeClr>
+          </a:solidFill>
+          <a:ln>
+            <a:solidFill>
+              <a:schemeClr val="bg1"/>
+            </a:solidFill>
+          </a:ln>
+        </p:spPr>
+        <p:txBody>
+          <a:bodyPr wrap="square">
+            <a:spAutoFit/>
+          </a:bodyPr>
+          <a:lstStyle/>
+          <a:p>
+            <a:r>
+              <a:rPr lang="fr-FR" sz="1600" dirty="0" err="1"/>
+              <a:t>Optim</a:t>
+            </a:r>
+            <a:r>
+              <a:rPr lang="fr-FR" sz="1600" dirty="0"/>
+              <a:t>. Problème 2</a:t>
+            </a:r>
+          </a:p>
+        </p:txBody>
+      </p:sp>
+      <p:sp>
+        <p:nvSpPr>
+          <p:cNvPr id="41" name="ZoneTexte 40">
+            <a:extLst>
+              <a:ext uri="{FF2B5EF4-FFF2-40B4-BE49-F238E27FC236}">
+                <a16:creationId xmlns:a16="http://schemas.microsoft.com/office/drawing/2014/main" id="{B1DF4CCF-C9D2-1FC1-E55E-72F2B169D284}"/>
+              </a:ext>
+            </a:extLst>
+          </p:cNvPr>
+          <p:cNvSpPr txBox="1"/>
+          <p:nvPr/>
+        </p:nvSpPr>
+        <p:spPr>
+          <a:xfrm>
+            <a:off x="8789451" y="4694700"/>
+            <a:ext cx="550415" cy="338554"/>
+          </a:xfrm>
+          <a:prstGeom prst="rect">
+            <a:avLst/>
+          </a:prstGeom>
+          <a:solidFill>
+            <a:schemeClr val="tx2">
+              <a:lumMod val="10000"/>
+              <a:lumOff val="90000"/>
+            </a:schemeClr>
+          </a:solidFill>
+          <a:ln>
+            <a:solidFill>
+              <a:schemeClr val="bg1"/>
+            </a:solidFill>
+          </a:ln>
+        </p:spPr>
+        <p:txBody>
+          <a:bodyPr wrap="square">
+            <a:spAutoFit/>
+          </a:bodyPr>
+          <a:lstStyle/>
+          <a:p>
+            <a:r>
+              <a:rPr lang="fr-FR" sz="1600" dirty="0"/>
+              <a:t>15’</a:t>
+            </a:r>
+          </a:p>
+        </p:txBody>
+      </p:sp>
+      <p:sp>
+        <p:nvSpPr>
+          <p:cNvPr id="42" name="ZoneTexte 41">
+            <a:extLst>
+              <a:ext uri="{FF2B5EF4-FFF2-40B4-BE49-F238E27FC236}">
+                <a16:creationId xmlns:a16="http://schemas.microsoft.com/office/drawing/2014/main" id="{D270C48B-3880-C911-FD6C-0F8B7D61DDE8}"/>
+              </a:ext>
+            </a:extLst>
+          </p:cNvPr>
+          <p:cNvSpPr txBox="1"/>
+          <p:nvPr/>
+        </p:nvSpPr>
+        <p:spPr>
+          <a:xfrm>
+            <a:off x="9463162" y="4685990"/>
+            <a:ext cx="2389239" cy="338554"/>
+          </a:xfrm>
+          <a:prstGeom prst="rect">
+            <a:avLst/>
+          </a:prstGeom>
+          <a:solidFill>
+            <a:schemeClr val="tx2">
+              <a:lumMod val="10000"/>
+              <a:lumOff val="90000"/>
+            </a:schemeClr>
+          </a:solidFill>
+        </p:spPr>
+        <p:txBody>
+          <a:bodyPr wrap="square">
+            <a:spAutoFit/>
+          </a:bodyPr>
+          <a:lstStyle/>
+          <a:p>
+            <a:r>
+              <a:rPr lang="fr-FR" sz="1600" dirty="0"/>
+              <a:t>B1_s3_ex32_optim</a:t>
+            </a:r>
+          </a:p>
+        </p:txBody>
+      </p:sp>
+      <p:sp>
+        <p:nvSpPr>
+          <p:cNvPr id="43" name="ZoneTexte 42">
+            <a:extLst>
+              <a:ext uri="{FF2B5EF4-FFF2-40B4-BE49-F238E27FC236}">
+                <a16:creationId xmlns:a16="http://schemas.microsoft.com/office/drawing/2014/main" id="{1E98C2A6-D0D6-F449-1B18-89AC9CC7B4B0}"/>
+              </a:ext>
+            </a:extLst>
+          </p:cNvPr>
+          <p:cNvSpPr txBox="1"/>
+          <p:nvPr/>
+        </p:nvSpPr>
+        <p:spPr>
+          <a:xfrm>
+            <a:off x="6675319" y="5091932"/>
+            <a:ext cx="2045115" cy="338554"/>
+          </a:xfrm>
+          <a:prstGeom prst="rect">
+            <a:avLst/>
+          </a:prstGeom>
+          <a:solidFill>
+            <a:schemeClr val="tx2">
+              <a:lumMod val="10000"/>
+              <a:lumOff val="90000"/>
+            </a:schemeClr>
+          </a:solidFill>
+          <a:ln>
+            <a:solidFill>
+              <a:schemeClr val="bg1"/>
+            </a:solidFill>
+          </a:ln>
+        </p:spPr>
+        <p:txBody>
+          <a:bodyPr wrap="square">
+            <a:spAutoFit/>
+          </a:bodyPr>
+          <a:lstStyle/>
+          <a:p>
+            <a:r>
+              <a:rPr lang="fr-FR" sz="1600" dirty="0" err="1"/>
+              <a:t>Scipy</a:t>
+            </a:r>
+            <a:endParaRPr lang="fr-FR" sz="1600" dirty="0"/>
+          </a:p>
+        </p:txBody>
+      </p:sp>
+      <p:sp>
+        <p:nvSpPr>
+          <p:cNvPr id="44" name="ZoneTexte 43">
+            <a:extLst>
+              <a:ext uri="{FF2B5EF4-FFF2-40B4-BE49-F238E27FC236}">
+                <a16:creationId xmlns:a16="http://schemas.microsoft.com/office/drawing/2014/main" id="{8C8E16C1-3625-636E-01CF-1F363447AF31}"/>
+              </a:ext>
+            </a:extLst>
+          </p:cNvPr>
+          <p:cNvSpPr txBox="1"/>
+          <p:nvPr/>
+        </p:nvSpPr>
+        <p:spPr>
+          <a:xfrm>
+            <a:off x="8789451" y="5091932"/>
+            <a:ext cx="550415" cy="338554"/>
+          </a:xfrm>
+          <a:prstGeom prst="rect">
+            <a:avLst/>
+          </a:prstGeom>
+          <a:solidFill>
+            <a:schemeClr val="tx2">
+              <a:lumMod val="10000"/>
+              <a:lumOff val="90000"/>
+            </a:schemeClr>
+          </a:solidFill>
+          <a:ln>
+            <a:solidFill>
+              <a:schemeClr val="bg1"/>
+            </a:solidFill>
+          </a:ln>
+        </p:spPr>
+        <p:txBody>
+          <a:bodyPr wrap="square">
+            <a:spAutoFit/>
+          </a:bodyPr>
+          <a:lstStyle/>
+          <a:p>
+            <a:r>
+              <a:rPr lang="fr-FR" sz="1600" dirty="0"/>
+              <a:t>15’</a:t>
+            </a:r>
+          </a:p>
+        </p:txBody>
+      </p:sp>
+      <p:sp>
+        <p:nvSpPr>
+          <p:cNvPr id="45" name="ZoneTexte 44">
+            <a:extLst>
+              <a:ext uri="{FF2B5EF4-FFF2-40B4-BE49-F238E27FC236}">
+                <a16:creationId xmlns:a16="http://schemas.microsoft.com/office/drawing/2014/main" id="{F053E96A-3F33-7BDA-49B9-15F5AADB78D4}"/>
+              </a:ext>
+            </a:extLst>
+          </p:cNvPr>
+          <p:cNvSpPr txBox="1"/>
+          <p:nvPr/>
+        </p:nvSpPr>
+        <p:spPr>
+          <a:xfrm>
+            <a:off x="9463162" y="5083222"/>
+            <a:ext cx="2389239" cy="338554"/>
+          </a:xfrm>
+          <a:prstGeom prst="rect">
+            <a:avLst/>
+          </a:prstGeom>
+          <a:solidFill>
+            <a:schemeClr val="tx2">
+              <a:lumMod val="10000"/>
+              <a:lumOff val="90000"/>
+            </a:schemeClr>
+          </a:solidFill>
+        </p:spPr>
+        <p:txBody>
+          <a:bodyPr wrap="square">
+            <a:spAutoFit/>
+          </a:bodyPr>
+          <a:lstStyle/>
+          <a:p>
+            <a:r>
+              <a:rPr lang="fr-FR" sz="1600" dirty="0"/>
+              <a:t>B1_s3_ex33_scipy</a:t>
+            </a:r>
+          </a:p>
+        </p:txBody>
+      </p:sp>
+      <p:sp>
+        <p:nvSpPr>
+          <p:cNvPr id="46" name="ZoneTexte 45">
+            <a:extLst>
+              <a:ext uri="{FF2B5EF4-FFF2-40B4-BE49-F238E27FC236}">
+                <a16:creationId xmlns:a16="http://schemas.microsoft.com/office/drawing/2014/main" id="{3E46A5D6-F294-452A-634C-C6270C11A72D}"/>
+              </a:ext>
+            </a:extLst>
+          </p:cNvPr>
+          <p:cNvSpPr txBox="1"/>
+          <p:nvPr/>
+        </p:nvSpPr>
+        <p:spPr>
+          <a:xfrm>
+            <a:off x="6675319" y="5489081"/>
+            <a:ext cx="2045115" cy="338554"/>
+          </a:xfrm>
+          <a:prstGeom prst="rect">
+            <a:avLst/>
+          </a:prstGeom>
+          <a:solidFill>
+            <a:srgbClr val="00B050"/>
+          </a:solidFill>
+        </p:spPr>
+        <p:txBody>
+          <a:bodyPr wrap="square">
+            <a:spAutoFit/>
+          </a:bodyPr>
+          <a:lstStyle/>
+          <a:p>
+            <a:r>
+              <a:rPr lang="fr-FR" sz="1600" dirty="0" err="1"/>
+              <a:t>Résol</a:t>
+            </a:r>
+            <a:r>
+              <a:rPr lang="fr-FR" sz="1600" dirty="0"/>
+              <a:t>. Problème 2 b</a:t>
+            </a:r>
+          </a:p>
+        </p:txBody>
+      </p:sp>
+      <p:sp>
+        <p:nvSpPr>
+          <p:cNvPr id="47" name="ZoneTexte 46">
+            <a:extLst>
+              <a:ext uri="{FF2B5EF4-FFF2-40B4-BE49-F238E27FC236}">
+                <a16:creationId xmlns:a16="http://schemas.microsoft.com/office/drawing/2014/main" id="{0B908436-B7D1-15D8-B8E2-8BDF946BF078}"/>
+              </a:ext>
+            </a:extLst>
+          </p:cNvPr>
+          <p:cNvSpPr txBox="1"/>
+          <p:nvPr/>
+        </p:nvSpPr>
+        <p:spPr>
+          <a:xfrm>
+            <a:off x="8800718" y="5489081"/>
+            <a:ext cx="540977" cy="338554"/>
+          </a:xfrm>
+          <a:prstGeom prst="rect">
+            <a:avLst/>
+          </a:prstGeom>
+          <a:solidFill>
+            <a:srgbClr val="00B050"/>
+          </a:solidFill>
+          <a:ln>
+            <a:solidFill>
+              <a:schemeClr val="bg1"/>
+            </a:solidFill>
+          </a:ln>
+        </p:spPr>
+        <p:txBody>
+          <a:bodyPr wrap="square">
+            <a:spAutoFit/>
+          </a:bodyPr>
+          <a:lstStyle/>
+          <a:p>
+            <a:r>
+              <a:rPr lang="fr-FR" sz="1600" dirty="0"/>
+              <a:t>15’</a:t>
+            </a:r>
+          </a:p>
+        </p:txBody>
+      </p:sp>
+      <p:pic>
+        <p:nvPicPr>
+          <p:cNvPr id="48" name="Graphique 47" descr="Flèches de chevron avec un remplissage uni">
+            <a:extLst>
+              <a:ext uri="{FF2B5EF4-FFF2-40B4-BE49-F238E27FC236}">
+                <a16:creationId xmlns:a16="http://schemas.microsoft.com/office/drawing/2014/main" id="{8EAB52D1-CCDC-1B54-4859-081D6B361390}"/>
+              </a:ext>
+            </a:extLst>
+          </p:cNvPr>
+          <p:cNvPicPr>
+            <a:picLocks noChangeAspect="1"/>
+          </p:cNvPicPr>
+          <p:nvPr/>
+        </p:nvPicPr>
+        <p:blipFill>
+          <a:blip r:embed="rId3">
+            <a:extLst>
+              <a:ext uri="{28A0092B-C50C-407E-A947-70E740481C1C}">
+                <a14:useLocalDpi xmlns:a14="http://schemas.microsoft.com/office/drawing/2010/main" val="0"/>
+              </a:ext>
+              <a:ext uri="{96DAC541-7B7A-43D3-8B79-37D633B846F1}">
+                <asvg:svgBlip xmlns:asvg="http://schemas.microsoft.com/office/drawing/2016/SVG/main" r:embed="rId4"/>
+              </a:ext>
+            </a:extLst>
+          </a:blip>
+          <a:stretch>
+            <a:fillRect/>
+          </a:stretch>
+        </p:blipFill>
+        <p:spPr>
+          <a:xfrm>
+            <a:off x="6067976" y="5375584"/>
+            <a:ext cx="565548" cy="565548"/>
+          </a:xfrm>
+          <a:prstGeom prst="rect">
+            <a:avLst/>
+          </a:prstGeom>
+        </p:spPr>
+      </p:pic>
     </p:spTree>
     <p:extLst>
       <p:ext uri="{BB962C8B-B14F-4D97-AF65-F5344CB8AC3E}">
         <p14:creationId xmlns:p14="http://schemas.microsoft.com/office/powerpoint/2010/main" val="3066932954"/>
+      </p:ext>
+    </p:extLst>
+  </p:cSld>
+  <p:clrMapOvr>
+    <a:masterClrMapping/>
+  </p:clrMapOvr>
+</p:sld>
+</file>
+
+<file path=ppt/slides/slide5.xml><?xml version="1.0" encoding="utf-8"?>
+<p:sld xmlns:a="http://schemas.openxmlformats.org/drawingml/2006/main" xmlns:r="http://schemas.openxmlformats.org/officeDocument/2006/relationships" xmlns:p="http://schemas.openxmlformats.org/presentationml/2006/main">
+  <p:cSld>
+    <p:spTree>
+      <p:nvGrpSpPr>
+        <p:cNvPr id="1" name=""/>
+        <p:cNvGrpSpPr/>
+        <p:nvPr/>
+      </p:nvGrpSpPr>
+      <p:grpSpPr>
+        <a:xfrm>
+          <a:off x="0" y="0"/>
+          <a:ext cx="0" cy="0"/>
+          <a:chOff x="0" y="0"/>
+          <a:chExt cx="0" cy="0"/>
+        </a:xfrm>
+      </p:grpSpPr>
+      <p:sp>
+        <p:nvSpPr>
+          <p:cNvPr id="2" name="Titre 1">
+            <a:extLst>
+              <a:ext uri="{FF2B5EF4-FFF2-40B4-BE49-F238E27FC236}">
+                <a16:creationId xmlns:a16="http://schemas.microsoft.com/office/drawing/2014/main" id="{90162AE8-C1B0-5C56-8313-DEE494F38273}"/>
+              </a:ext>
+            </a:extLst>
+          </p:cNvPr>
+          <p:cNvSpPr>
+            <a:spLocks noGrp="1"/>
+          </p:cNvSpPr>
+          <p:nvPr>
+            <p:ph type="title"/>
+          </p:nvPr>
+        </p:nvSpPr>
+        <p:spPr/>
+        <p:txBody>
+          <a:bodyPr/>
+          <a:lstStyle/>
+          <a:p>
+            <a:r>
+              <a:rPr lang="fr-FR" dirty="0"/>
+              <a:t>Déroulement du bloc 1</a:t>
+            </a:r>
+          </a:p>
+        </p:txBody>
+      </p:sp>
+      <p:pic>
+        <p:nvPicPr>
+          <p:cNvPr id="5" name="Image 4" descr="Une image contenant texte&#10;&#10;Description générée automatiquement">
+            <a:extLst>
+              <a:ext uri="{FF2B5EF4-FFF2-40B4-BE49-F238E27FC236}">
+                <a16:creationId xmlns:a16="http://schemas.microsoft.com/office/drawing/2014/main" id="{204ADC40-1D61-539F-22ED-6B21D67FBDE6}"/>
+              </a:ext>
+            </a:extLst>
+          </p:cNvPr>
+          <p:cNvPicPr>
+            <a:picLocks noChangeAspect="1"/>
+          </p:cNvPicPr>
+          <p:nvPr/>
+        </p:nvPicPr>
+        <p:blipFill>
+          <a:blip r:embed="rId2">
+            <a:extLst>
+              <a:ext uri="{28A0092B-C50C-407E-A947-70E740481C1C}">
+                <a14:useLocalDpi xmlns:a14="http://schemas.microsoft.com/office/drawing/2010/main" val="0"/>
+              </a:ext>
+            </a:extLst>
+          </a:blip>
+          <a:stretch>
+            <a:fillRect/>
+          </a:stretch>
+        </p:blipFill>
+        <p:spPr>
+          <a:xfrm>
+            <a:off x="202922" y="5934456"/>
+            <a:ext cx="1825291" cy="749808"/>
+          </a:xfrm>
+          <a:prstGeom prst="rect">
+            <a:avLst/>
+          </a:prstGeom>
+        </p:spPr>
+      </p:pic>
+      <p:sp>
+        <p:nvSpPr>
+          <p:cNvPr id="6" name="CustomShape 3">
+            <a:extLst>
+              <a:ext uri="{FF2B5EF4-FFF2-40B4-BE49-F238E27FC236}">
+                <a16:creationId xmlns:a16="http://schemas.microsoft.com/office/drawing/2014/main" id="{7E776801-EC52-B2A2-9F28-F1F9D32CF093}"/>
+              </a:ext>
+            </a:extLst>
+          </p:cNvPr>
+          <p:cNvSpPr/>
+          <p:nvPr/>
+        </p:nvSpPr>
+        <p:spPr>
+          <a:xfrm>
+            <a:off x="548852" y="2243956"/>
+            <a:ext cx="4051393" cy="492443"/>
+          </a:xfrm>
+          <a:prstGeom prst="rect">
+            <a:avLst/>
+          </a:prstGeom>
+          <a:solidFill>
+            <a:schemeClr val="accent2">
+              <a:lumMod val="75000"/>
+            </a:schemeClr>
+          </a:solidFill>
+          <a:ln w="0">
+            <a:noFill/>
+          </a:ln>
+        </p:spPr>
+        <p:style>
+          <a:lnRef idx="0">
+            <a:scrgbClr r="0" g="0" b="0"/>
+          </a:lnRef>
+          <a:fillRef idx="0">
+            <a:scrgbClr r="0" g="0" b="0"/>
+          </a:fillRef>
+          <a:effectRef idx="0">
+            <a:scrgbClr r="0" g="0" b="0"/>
+          </a:effectRef>
+          <a:fontRef idx="minor"/>
+        </p:style>
+        <p:txBody>
+          <a:bodyPr wrap="square" tIns="91440" bIns="91440">
+            <a:spAutoFit/>
+          </a:bodyPr>
+          <a:lstStyle/>
+          <a:p>
+            <a:pPr algn="ctr">
+              <a:lnSpc>
+                <a:spcPct val="100000"/>
+              </a:lnSpc>
+              <a:tabLst>
+                <a:tab pos="0" algn="l"/>
+              </a:tabLst>
+            </a:pPr>
+            <a:r>
+              <a:rPr lang="fr-FR" sz="2000" b="1" spc="-1" dirty="0">
+                <a:solidFill>
+                  <a:schemeClr val="bg1"/>
+                </a:solidFill>
+                <a:latin typeface="Trebuchet MS"/>
+              </a:rPr>
+              <a:t>Méthodes numériques</a:t>
+            </a:r>
+            <a:endParaRPr lang="fr-FR" sz="2000" b="0" strike="noStrike" spc="-1" dirty="0">
+              <a:solidFill>
+                <a:schemeClr val="bg1"/>
+              </a:solidFill>
+              <a:latin typeface="Arial"/>
+            </a:endParaRPr>
+          </a:p>
+        </p:txBody>
+      </p:sp>
+      <p:sp>
+        <p:nvSpPr>
+          <p:cNvPr id="16" name="CustomShape 3">
+            <a:extLst>
+              <a:ext uri="{FF2B5EF4-FFF2-40B4-BE49-F238E27FC236}">
+                <a16:creationId xmlns:a16="http://schemas.microsoft.com/office/drawing/2014/main" id="{01E65D51-FF37-EC4C-FC12-D45806EC4C03}"/>
+              </a:ext>
+            </a:extLst>
+          </p:cNvPr>
+          <p:cNvSpPr/>
+          <p:nvPr/>
+        </p:nvSpPr>
+        <p:spPr>
+          <a:xfrm>
+            <a:off x="591593" y="2896357"/>
+            <a:ext cx="1461845" cy="430887"/>
+          </a:xfrm>
+          <a:prstGeom prst="rect">
+            <a:avLst/>
+          </a:prstGeom>
+          <a:solidFill>
+            <a:schemeClr val="accent2">
+              <a:lumMod val="75000"/>
+            </a:schemeClr>
+          </a:solidFill>
+          <a:ln w="0">
+            <a:noFill/>
+          </a:ln>
+        </p:spPr>
+        <p:style>
+          <a:lnRef idx="0">
+            <a:scrgbClr r="0" g="0" b="0"/>
+          </a:lnRef>
+          <a:fillRef idx="0">
+            <a:scrgbClr r="0" g="0" b="0"/>
+          </a:fillRef>
+          <a:effectRef idx="0">
+            <a:scrgbClr r="0" g="0" b="0"/>
+          </a:effectRef>
+          <a:fontRef idx="minor"/>
+        </p:style>
+        <p:txBody>
+          <a:bodyPr wrap="square" tIns="91440" bIns="91440">
+            <a:spAutoFit/>
+          </a:bodyPr>
+          <a:lstStyle/>
+          <a:p>
+            <a:pPr algn="ctr">
+              <a:lnSpc>
+                <a:spcPct val="100000"/>
+              </a:lnSpc>
+              <a:tabLst>
+                <a:tab pos="0" algn="l"/>
+              </a:tabLst>
+            </a:pPr>
+            <a:r>
+              <a:rPr lang="fr-FR" sz="1600" b="1" spc="-1" dirty="0">
+                <a:solidFill>
+                  <a:schemeClr val="bg1"/>
+                </a:solidFill>
+                <a:latin typeface="Trebuchet MS"/>
+              </a:rPr>
+              <a:t>Séance 3</a:t>
+            </a:r>
+            <a:endParaRPr lang="fr-FR" sz="1600" b="0" strike="noStrike" spc="-1" dirty="0">
+              <a:solidFill>
+                <a:schemeClr val="bg1"/>
+              </a:solidFill>
+              <a:latin typeface="Arial"/>
+            </a:endParaRPr>
+          </a:p>
+        </p:txBody>
+      </p:sp>
+      <p:sp>
+        <p:nvSpPr>
+          <p:cNvPr id="18" name="ZoneTexte 17">
+            <a:extLst>
+              <a:ext uri="{FF2B5EF4-FFF2-40B4-BE49-F238E27FC236}">
+                <a16:creationId xmlns:a16="http://schemas.microsoft.com/office/drawing/2014/main" id="{268C6221-6261-89B6-F975-2D41AFA3E893}"/>
+              </a:ext>
+            </a:extLst>
+          </p:cNvPr>
+          <p:cNvSpPr txBox="1"/>
+          <p:nvPr/>
+        </p:nvSpPr>
+        <p:spPr>
+          <a:xfrm>
+            <a:off x="717750" y="3796346"/>
+            <a:ext cx="2045115" cy="338554"/>
+          </a:xfrm>
+          <a:prstGeom prst="rect">
+            <a:avLst/>
+          </a:prstGeom>
+          <a:solidFill>
+            <a:schemeClr val="tx2">
+              <a:lumMod val="10000"/>
+              <a:lumOff val="90000"/>
+            </a:schemeClr>
+          </a:solidFill>
+        </p:spPr>
+        <p:txBody>
+          <a:bodyPr wrap="square">
+            <a:spAutoFit/>
+          </a:bodyPr>
+          <a:lstStyle/>
+          <a:p>
+            <a:r>
+              <a:rPr lang="fr-FR" sz="1600" dirty="0" err="1"/>
+              <a:t>Appr</a:t>
+            </a:r>
+            <a:r>
+              <a:rPr lang="fr-FR" sz="1600" dirty="0"/>
+              <a:t>. Système</a:t>
+            </a:r>
+          </a:p>
+        </p:txBody>
+      </p:sp>
+      <p:sp>
+        <p:nvSpPr>
+          <p:cNvPr id="19" name="ZoneTexte 18">
+            <a:extLst>
+              <a:ext uri="{FF2B5EF4-FFF2-40B4-BE49-F238E27FC236}">
+                <a16:creationId xmlns:a16="http://schemas.microsoft.com/office/drawing/2014/main" id="{89D9C4CA-F84E-F72E-A3F7-89747DEC6DA3}"/>
+              </a:ext>
+            </a:extLst>
+          </p:cNvPr>
+          <p:cNvSpPr txBox="1"/>
+          <p:nvPr/>
+        </p:nvSpPr>
+        <p:spPr>
+          <a:xfrm>
+            <a:off x="717750" y="3379008"/>
+            <a:ext cx="2045115" cy="338554"/>
+          </a:xfrm>
+          <a:prstGeom prst="rect">
+            <a:avLst/>
+          </a:prstGeom>
+          <a:solidFill>
+            <a:schemeClr val="tx2">
+              <a:lumMod val="10000"/>
+              <a:lumOff val="90000"/>
+            </a:schemeClr>
+          </a:solidFill>
+          <a:ln>
+            <a:solidFill>
+              <a:schemeClr val="bg1"/>
+            </a:solidFill>
+          </a:ln>
+        </p:spPr>
+        <p:txBody>
+          <a:bodyPr wrap="square">
+            <a:spAutoFit/>
+          </a:bodyPr>
+          <a:lstStyle/>
+          <a:p>
+            <a:r>
+              <a:rPr lang="fr-FR" sz="1600" dirty="0"/>
+              <a:t>Problématique</a:t>
+            </a:r>
+          </a:p>
+        </p:txBody>
+      </p:sp>
+      <p:sp>
+        <p:nvSpPr>
+          <p:cNvPr id="20" name="ZoneTexte 19">
+            <a:extLst>
+              <a:ext uri="{FF2B5EF4-FFF2-40B4-BE49-F238E27FC236}">
+                <a16:creationId xmlns:a16="http://schemas.microsoft.com/office/drawing/2014/main" id="{E9BDF498-6057-C2B7-9A60-4B5B7CEF7AF6}"/>
+              </a:ext>
+            </a:extLst>
+          </p:cNvPr>
+          <p:cNvSpPr txBox="1"/>
+          <p:nvPr/>
+        </p:nvSpPr>
+        <p:spPr>
+          <a:xfrm>
+            <a:off x="2831882" y="3379008"/>
+            <a:ext cx="550415" cy="338554"/>
+          </a:xfrm>
+          <a:prstGeom prst="rect">
+            <a:avLst/>
+          </a:prstGeom>
+          <a:solidFill>
+            <a:schemeClr val="tx2">
+              <a:lumMod val="10000"/>
+              <a:lumOff val="90000"/>
+            </a:schemeClr>
+          </a:solidFill>
+          <a:ln>
+            <a:solidFill>
+              <a:schemeClr val="bg1"/>
+            </a:solidFill>
+          </a:ln>
+        </p:spPr>
+        <p:txBody>
+          <a:bodyPr wrap="square">
+            <a:spAutoFit/>
+          </a:bodyPr>
+          <a:lstStyle/>
+          <a:p>
+            <a:r>
+              <a:rPr lang="fr-FR" sz="1600" dirty="0"/>
+              <a:t>10’</a:t>
+            </a:r>
+          </a:p>
+        </p:txBody>
+      </p:sp>
+      <p:sp>
+        <p:nvSpPr>
+          <p:cNvPr id="21" name="ZoneTexte 20">
+            <a:extLst>
+              <a:ext uri="{FF2B5EF4-FFF2-40B4-BE49-F238E27FC236}">
+                <a16:creationId xmlns:a16="http://schemas.microsoft.com/office/drawing/2014/main" id="{FB25B6F7-5CB4-AD69-E8B6-A1E6C2719148}"/>
+              </a:ext>
+            </a:extLst>
+          </p:cNvPr>
+          <p:cNvSpPr txBox="1"/>
+          <p:nvPr/>
+        </p:nvSpPr>
+        <p:spPr>
+          <a:xfrm>
+            <a:off x="2831882" y="3791991"/>
+            <a:ext cx="550415" cy="338554"/>
+          </a:xfrm>
+          <a:prstGeom prst="rect">
+            <a:avLst/>
+          </a:prstGeom>
+          <a:solidFill>
+            <a:schemeClr val="tx2">
+              <a:lumMod val="10000"/>
+              <a:lumOff val="90000"/>
+            </a:schemeClr>
+          </a:solidFill>
+          <a:ln>
+            <a:solidFill>
+              <a:schemeClr val="bg1"/>
+            </a:solidFill>
+          </a:ln>
+        </p:spPr>
+        <p:txBody>
+          <a:bodyPr wrap="square">
+            <a:spAutoFit/>
+          </a:bodyPr>
+          <a:lstStyle/>
+          <a:p>
+            <a:r>
+              <a:rPr lang="fr-FR" sz="1600" dirty="0"/>
+              <a:t>20’</a:t>
+            </a:r>
+          </a:p>
+        </p:txBody>
+      </p:sp>
+      <p:sp>
+        <p:nvSpPr>
+          <p:cNvPr id="22" name="ZoneTexte 21">
+            <a:extLst>
+              <a:ext uri="{FF2B5EF4-FFF2-40B4-BE49-F238E27FC236}">
+                <a16:creationId xmlns:a16="http://schemas.microsoft.com/office/drawing/2014/main" id="{0C197052-27BF-E0BD-A301-698A60BBBE62}"/>
+              </a:ext>
+            </a:extLst>
+          </p:cNvPr>
+          <p:cNvSpPr txBox="1"/>
+          <p:nvPr/>
+        </p:nvSpPr>
+        <p:spPr>
+          <a:xfrm>
+            <a:off x="3505594" y="3791991"/>
+            <a:ext cx="2389239" cy="338554"/>
+          </a:xfrm>
+          <a:prstGeom prst="rect">
+            <a:avLst/>
+          </a:prstGeom>
+          <a:solidFill>
+            <a:schemeClr val="tx2">
+              <a:lumMod val="10000"/>
+              <a:lumOff val="90000"/>
+            </a:schemeClr>
+          </a:solidFill>
+        </p:spPr>
+        <p:txBody>
+          <a:bodyPr wrap="square">
+            <a:spAutoFit/>
+          </a:bodyPr>
+          <a:lstStyle/>
+          <a:p>
+            <a:r>
+              <a:rPr lang="fr-FR" sz="1600" dirty="0"/>
+              <a:t>B1_s4_ex41_control</a:t>
+            </a:r>
+          </a:p>
+        </p:txBody>
+      </p:sp>
+      <p:sp>
+        <p:nvSpPr>
+          <p:cNvPr id="23" name="ZoneTexte 22">
+            <a:extLst>
+              <a:ext uri="{FF2B5EF4-FFF2-40B4-BE49-F238E27FC236}">
+                <a16:creationId xmlns:a16="http://schemas.microsoft.com/office/drawing/2014/main" id="{BF9CF0A7-6CAD-51E6-96DD-16F1E3F0784F}"/>
+              </a:ext>
+            </a:extLst>
+          </p:cNvPr>
+          <p:cNvSpPr txBox="1"/>
+          <p:nvPr/>
+        </p:nvSpPr>
+        <p:spPr>
+          <a:xfrm>
+            <a:off x="717749" y="4213684"/>
+            <a:ext cx="2045115" cy="338554"/>
+          </a:xfrm>
+          <a:prstGeom prst="rect">
+            <a:avLst/>
+          </a:prstGeom>
+          <a:solidFill>
+            <a:srgbClr val="00B050"/>
+          </a:solidFill>
+        </p:spPr>
+        <p:txBody>
+          <a:bodyPr wrap="square">
+            <a:spAutoFit/>
+          </a:bodyPr>
+          <a:lstStyle/>
+          <a:p>
+            <a:r>
+              <a:rPr lang="fr-FR" sz="1600" dirty="0" err="1"/>
+              <a:t>Résol</a:t>
+            </a:r>
+            <a:r>
+              <a:rPr lang="fr-FR" sz="1600" dirty="0"/>
+              <a:t>. Problème 1</a:t>
+            </a:r>
+          </a:p>
+        </p:txBody>
+      </p:sp>
+      <p:sp>
+        <p:nvSpPr>
+          <p:cNvPr id="24" name="ZoneTexte 23">
+            <a:extLst>
+              <a:ext uri="{FF2B5EF4-FFF2-40B4-BE49-F238E27FC236}">
+                <a16:creationId xmlns:a16="http://schemas.microsoft.com/office/drawing/2014/main" id="{F6B3C092-19F2-CA67-4A44-F98BBAADAD40}"/>
+              </a:ext>
+            </a:extLst>
+          </p:cNvPr>
+          <p:cNvSpPr txBox="1"/>
+          <p:nvPr/>
+        </p:nvSpPr>
+        <p:spPr>
+          <a:xfrm>
+            <a:off x="2831882" y="4204974"/>
+            <a:ext cx="540977" cy="338554"/>
+          </a:xfrm>
+          <a:prstGeom prst="rect">
+            <a:avLst/>
+          </a:prstGeom>
+          <a:solidFill>
+            <a:srgbClr val="00B050"/>
+          </a:solidFill>
+          <a:ln>
+            <a:solidFill>
+              <a:schemeClr val="bg1"/>
+            </a:solidFill>
+          </a:ln>
+        </p:spPr>
+        <p:txBody>
+          <a:bodyPr wrap="square">
+            <a:spAutoFit/>
+          </a:bodyPr>
+          <a:lstStyle/>
+          <a:p>
+            <a:r>
+              <a:rPr lang="fr-FR" sz="1600" dirty="0"/>
+              <a:t>30’</a:t>
+            </a:r>
+          </a:p>
+        </p:txBody>
+      </p:sp>
+      <p:pic>
+        <p:nvPicPr>
+          <p:cNvPr id="3" name="Graphique 2" descr="Flèches de chevron avec un remplissage uni">
+            <a:extLst>
+              <a:ext uri="{FF2B5EF4-FFF2-40B4-BE49-F238E27FC236}">
+                <a16:creationId xmlns:a16="http://schemas.microsoft.com/office/drawing/2014/main" id="{83030DF5-3598-5C00-02BC-7BE515ABC369}"/>
+              </a:ext>
+            </a:extLst>
+          </p:cNvPr>
+          <p:cNvPicPr>
+            <a:picLocks noChangeAspect="1"/>
+          </p:cNvPicPr>
+          <p:nvPr/>
+        </p:nvPicPr>
+        <p:blipFill>
+          <a:blip r:embed="rId3">
+            <a:extLst>
+              <a:ext uri="{28A0092B-C50C-407E-A947-70E740481C1C}">
+                <a14:useLocalDpi xmlns:a14="http://schemas.microsoft.com/office/drawing/2010/main" val="0"/>
+              </a:ext>
+              <a:ext uri="{96DAC541-7B7A-43D3-8B79-37D633B846F1}">
+                <asvg:svgBlip xmlns:asvg="http://schemas.microsoft.com/office/drawing/2016/SVG/main" r:embed="rId4"/>
+              </a:ext>
+            </a:extLst>
+          </a:blip>
+          <a:stretch>
+            <a:fillRect/>
+          </a:stretch>
+        </p:blipFill>
+        <p:spPr>
+          <a:xfrm>
+            <a:off x="95273" y="4100187"/>
+            <a:ext cx="565548" cy="565548"/>
+          </a:xfrm>
+          <a:prstGeom prst="rect">
+            <a:avLst/>
+          </a:prstGeom>
+        </p:spPr>
+      </p:pic>
+    </p:spTree>
+    <p:extLst>
+      <p:ext uri="{BB962C8B-B14F-4D97-AF65-F5344CB8AC3E}">
+        <p14:creationId xmlns:p14="http://schemas.microsoft.com/office/powerpoint/2010/main" val="321688005"/>
       </p:ext>
     </p:extLst>
   </p:cSld>

</xml_diff>

<commit_message>
Update Bloc 1 - reorganisation
</commit_message>
<xml_diff>
--- a/s5_outils_numeriques/b1_outils_numeriques/seance1_demistifier_python/B1_0_Deroulement.pptx
+++ b/s5_outils_numeriques/b1_outils_numeriques/seance1_demistifier_python/B1_0_Deroulement.pptx
@@ -7813,6 +7813,76 @@
           </a:p>
         </p:txBody>
       </p:sp>
+      <p:sp>
+        <p:nvSpPr>
+          <p:cNvPr id="32" name="ZoneTexte 31">
+            <a:extLst>
+              <a:ext uri="{FF2B5EF4-FFF2-40B4-BE49-F238E27FC236}">
+                <a16:creationId xmlns:a16="http://schemas.microsoft.com/office/drawing/2014/main" id="{B144DC40-CCEE-16B4-BEC6-0FB943C59D09}"/>
+              </a:ext>
+            </a:extLst>
+          </p:cNvPr>
+          <p:cNvSpPr txBox="1"/>
+          <p:nvPr/>
+        </p:nvSpPr>
+        <p:spPr>
+          <a:xfrm>
+            <a:off x="9410983" y="3259723"/>
+            <a:ext cx="1818968" cy="338554"/>
+          </a:xfrm>
+          <a:prstGeom prst="rect">
+            <a:avLst/>
+          </a:prstGeom>
+          <a:noFill/>
+        </p:spPr>
+        <p:txBody>
+          <a:bodyPr wrap="square">
+            <a:spAutoFit/>
+          </a:bodyPr>
+          <a:lstStyle/>
+          <a:p>
+            <a:r>
+              <a:rPr lang="fr-FR" sz="1600" b="1" dirty="0"/>
+              <a:t>exemples</a:t>
+            </a:r>
+          </a:p>
+        </p:txBody>
+      </p:sp>
+      <p:sp>
+        <p:nvSpPr>
+          <p:cNvPr id="35" name="ZoneTexte 34">
+            <a:extLst>
+              <a:ext uri="{FF2B5EF4-FFF2-40B4-BE49-F238E27FC236}">
+                <a16:creationId xmlns:a16="http://schemas.microsoft.com/office/drawing/2014/main" id="{B82D5D81-C904-9A02-57BC-19010E6710CA}"/>
+              </a:ext>
+            </a:extLst>
+          </p:cNvPr>
+          <p:cNvSpPr txBox="1"/>
+          <p:nvPr/>
+        </p:nvSpPr>
+        <p:spPr>
+          <a:xfrm>
+            <a:off x="3505594" y="2995752"/>
+            <a:ext cx="1818968" cy="338554"/>
+          </a:xfrm>
+          <a:prstGeom prst="rect">
+            <a:avLst/>
+          </a:prstGeom>
+          <a:noFill/>
+        </p:spPr>
+        <p:txBody>
+          <a:bodyPr wrap="square">
+            <a:spAutoFit/>
+          </a:bodyPr>
+          <a:lstStyle/>
+          <a:p>
+            <a:r>
+              <a:rPr lang="fr-FR" sz="1600" b="1" dirty="0"/>
+              <a:t>exemples</a:t>
+            </a:r>
+          </a:p>
+        </p:txBody>
+      </p:sp>
     </p:spTree>
     <p:extLst>
       <p:ext uri="{BB962C8B-B14F-4D97-AF65-F5344CB8AC3E}">
@@ -9321,6 +9391,156 @@
           </a:prstGeom>
         </p:spPr>
       </p:pic>
+      <p:sp>
+        <p:nvSpPr>
+          <p:cNvPr id="17" name="ZoneTexte 16">
+            <a:extLst>
+              <a:ext uri="{FF2B5EF4-FFF2-40B4-BE49-F238E27FC236}">
+                <a16:creationId xmlns:a16="http://schemas.microsoft.com/office/drawing/2014/main" id="{F8A8E61A-36AF-34F2-952D-E9C8DA3455B1}"/>
+              </a:ext>
+            </a:extLst>
+          </p:cNvPr>
+          <p:cNvSpPr txBox="1"/>
+          <p:nvPr/>
+        </p:nvSpPr>
+        <p:spPr>
+          <a:xfrm>
+            <a:off x="3505594" y="2995752"/>
+            <a:ext cx="1818968" cy="338554"/>
+          </a:xfrm>
+          <a:prstGeom prst="rect">
+            <a:avLst/>
+          </a:prstGeom>
+          <a:noFill/>
+        </p:spPr>
+        <p:txBody>
+          <a:bodyPr wrap="square">
+            <a:spAutoFit/>
+          </a:bodyPr>
+          <a:lstStyle/>
+          <a:p>
+            <a:r>
+              <a:rPr lang="fr-FR" sz="1600" b="1" dirty="0"/>
+              <a:t>exemples</a:t>
+            </a:r>
+          </a:p>
+        </p:txBody>
+      </p:sp>
+      <p:sp>
+        <p:nvSpPr>
+          <p:cNvPr id="25" name="ZoneTexte 24">
+            <a:extLst>
+              <a:ext uri="{FF2B5EF4-FFF2-40B4-BE49-F238E27FC236}">
+                <a16:creationId xmlns:a16="http://schemas.microsoft.com/office/drawing/2014/main" id="{8C7DD710-76A0-8892-0F9D-FDC0651E70B2}"/>
+              </a:ext>
+            </a:extLst>
+          </p:cNvPr>
+          <p:cNvSpPr txBox="1"/>
+          <p:nvPr/>
+        </p:nvSpPr>
+        <p:spPr>
+          <a:xfrm>
+            <a:off x="9410983" y="3259723"/>
+            <a:ext cx="1818968" cy="338554"/>
+          </a:xfrm>
+          <a:prstGeom prst="rect">
+            <a:avLst/>
+          </a:prstGeom>
+          <a:noFill/>
+        </p:spPr>
+        <p:txBody>
+          <a:bodyPr wrap="square">
+            <a:spAutoFit/>
+          </a:bodyPr>
+          <a:lstStyle/>
+          <a:p>
+            <a:r>
+              <a:rPr lang="fr-FR" sz="1600" b="1" dirty="0"/>
+              <a:t>exemples</a:t>
+            </a:r>
+          </a:p>
+        </p:txBody>
+      </p:sp>
+      <p:sp>
+        <p:nvSpPr>
+          <p:cNvPr id="27" name="ZoneTexte 26">
+            <a:extLst>
+              <a:ext uri="{FF2B5EF4-FFF2-40B4-BE49-F238E27FC236}">
+                <a16:creationId xmlns:a16="http://schemas.microsoft.com/office/drawing/2014/main" id="{43A26E39-3E75-DB05-189C-90E87D1A0E99}"/>
+              </a:ext>
+            </a:extLst>
+          </p:cNvPr>
+          <p:cNvSpPr txBox="1"/>
+          <p:nvPr/>
+        </p:nvSpPr>
+        <p:spPr>
+          <a:xfrm>
+            <a:off x="8175137" y="6331140"/>
+            <a:ext cx="3583465" cy="307777"/>
+          </a:xfrm>
+          <a:prstGeom prst="rect">
+            <a:avLst/>
+          </a:prstGeom>
+          <a:noFill/>
+        </p:spPr>
+        <p:txBody>
+          <a:bodyPr wrap="square">
+            <a:spAutoFit/>
+          </a:bodyPr>
+          <a:lstStyle/>
+          <a:p>
+            <a:r>
+              <a:rPr lang="fr-FR" sz="1400" dirty="0"/>
+              <a:t>b1_s3_sys_equa_diff_SIR_disease</a:t>
+            </a:r>
+          </a:p>
+        </p:txBody>
+      </p:sp>
+      <p:sp>
+        <p:nvSpPr>
+          <p:cNvPr id="28" name="ZoneTexte 27">
+            <a:extLst>
+              <a:ext uri="{FF2B5EF4-FFF2-40B4-BE49-F238E27FC236}">
+                <a16:creationId xmlns:a16="http://schemas.microsoft.com/office/drawing/2014/main" id="{C8E76DF3-6EAF-4DB1-CBA4-7054B126ED4A}"/>
+              </a:ext>
+            </a:extLst>
+          </p:cNvPr>
+          <p:cNvSpPr txBox="1"/>
+          <p:nvPr/>
+        </p:nvSpPr>
+        <p:spPr>
+          <a:xfrm>
+            <a:off x="6067976" y="6315751"/>
+            <a:ext cx="2045115" cy="338554"/>
+          </a:xfrm>
+          <a:prstGeom prst="rect">
+            <a:avLst/>
+          </a:prstGeom>
+          <a:solidFill>
+            <a:schemeClr val="tx2">
+              <a:lumMod val="10000"/>
+              <a:lumOff val="90000"/>
+            </a:schemeClr>
+          </a:solidFill>
+          <a:ln>
+            <a:solidFill>
+              <a:schemeClr val="bg1"/>
+            </a:solidFill>
+          </a:ln>
+        </p:spPr>
+        <p:txBody>
+          <a:bodyPr wrap="square">
+            <a:spAutoFit/>
+          </a:bodyPr>
+          <a:lstStyle/>
+          <a:p>
+            <a:r>
+              <a:rPr lang="fr-FR" sz="1600" dirty="0"/>
+              <a:t>Autre exemple</a:t>
+            </a:r>
+          </a:p>
+        </p:txBody>
+      </p:sp>
     </p:spTree>
     <p:extLst>
       <p:ext uri="{BB962C8B-B14F-4D97-AF65-F5344CB8AC3E}">
@@ -9550,7 +9770,7 @@
                 </a:solidFill>
                 <a:latin typeface="Trebuchet MS"/>
               </a:rPr>
-              <a:t>Séance 3</a:t>
+              <a:t>Séance 4</a:t>
             </a:r>
             <a:endParaRPr lang="fr-FR" sz="1600" b="0" strike="noStrike" spc="-1" dirty="0">
               <a:solidFill>
@@ -9902,6 +10122,166 @@
           </a:prstGeom>
         </p:spPr>
       </p:pic>
+      <p:sp>
+        <p:nvSpPr>
+          <p:cNvPr id="4" name="ZoneTexte 3">
+            <a:extLst>
+              <a:ext uri="{FF2B5EF4-FFF2-40B4-BE49-F238E27FC236}">
+                <a16:creationId xmlns:a16="http://schemas.microsoft.com/office/drawing/2014/main" id="{B4751079-8FDF-15A5-D692-7F940FE2E0FB}"/>
+              </a:ext>
+            </a:extLst>
+          </p:cNvPr>
+          <p:cNvSpPr txBox="1"/>
+          <p:nvPr/>
+        </p:nvSpPr>
+        <p:spPr>
+          <a:xfrm>
+            <a:off x="3505594" y="2995752"/>
+            <a:ext cx="1818968" cy="338554"/>
+          </a:xfrm>
+          <a:prstGeom prst="rect">
+            <a:avLst/>
+          </a:prstGeom>
+          <a:noFill/>
+        </p:spPr>
+        <p:txBody>
+          <a:bodyPr wrap="square">
+            <a:spAutoFit/>
+          </a:bodyPr>
+          <a:lstStyle/>
+          <a:p>
+            <a:r>
+              <a:rPr lang="fr-FR" sz="1600" b="1" dirty="0"/>
+              <a:t>exemples</a:t>
+            </a:r>
+          </a:p>
+        </p:txBody>
+      </p:sp>
+      <p:sp>
+        <p:nvSpPr>
+          <p:cNvPr id="7" name="ZoneTexte 6">
+            <a:extLst>
+              <a:ext uri="{FF2B5EF4-FFF2-40B4-BE49-F238E27FC236}">
+                <a16:creationId xmlns:a16="http://schemas.microsoft.com/office/drawing/2014/main" id="{3230895E-C2C5-7563-9F5A-20038633869D}"/>
+              </a:ext>
+            </a:extLst>
+          </p:cNvPr>
+          <p:cNvSpPr txBox="1"/>
+          <p:nvPr/>
+        </p:nvSpPr>
+        <p:spPr>
+          <a:xfrm>
+            <a:off x="717750" y="4626407"/>
+            <a:ext cx="2045115" cy="338554"/>
+          </a:xfrm>
+          <a:prstGeom prst="rect">
+            <a:avLst/>
+          </a:prstGeom>
+          <a:solidFill>
+            <a:schemeClr val="tx2">
+              <a:lumMod val="10000"/>
+              <a:lumOff val="90000"/>
+            </a:schemeClr>
+          </a:solidFill>
+        </p:spPr>
+        <p:txBody>
+          <a:bodyPr wrap="square">
+            <a:spAutoFit/>
+          </a:bodyPr>
+          <a:lstStyle/>
+          <a:p>
+            <a:r>
+              <a:rPr lang="fr-FR" sz="1600" dirty="0"/>
+              <a:t>Classes et objets</a:t>
+            </a:r>
+          </a:p>
+        </p:txBody>
+      </p:sp>
+      <p:sp>
+        <p:nvSpPr>
+          <p:cNvPr id="8" name="ZoneTexte 7">
+            <a:extLst>
+              <a:ext uri="{FF2B5EF4-FFF2-40B4-BE49-F238E27FC236}">
+                <a16:creationId xmlns:a16="http://schemas.microsoft.com/office/drawing/2014/main" id="{F1F759D3-E369-2A63-209C-84CD04618DF2}"/>
+              </a:ext>
+            </a:extLst>
+          </p:cNvPr>
+          <p:cNvSpPr txBox="1"/>
+          <p:nvPr/>
+        </p:nvSpPr>
+        <p:spPr>
+          <a:xfrm>
+            <a:off x="2831882" y="4622052"/>
+            <a:ext cx="550415" cy="338554"/>
+          </a:xfrm>
+          <a:prstGeom prst="rect">
+            <a:avLst/>
+          </a:prstGeom>
+          <a:solidFill>
+            <a:schemeClr val="tx2">
+              <a:lumMod val="10000"/>
+              <a:lumOff val="90000"/>
+            </a:schemeClr>
+          </a:solidFill>
+          <a:ln>
+            <a:solidFill>
+              <a:schemeClr val="bg1"/>
+            </a:solidFill>
+          </a:ln>
+        </p:spPr>
+        <p:txBody>
+          <a:bodyPr wrap="square">
+            <a:spAutoFit/>
+          </a:bodyPr>
+          <a:lstStyle/>
+          <a:p>
+            <a:r>
+              <a:rPr lang="fr-FR" sz="1600" dirty="0"/>
+              <a:t>20’</a:t>
+            </a:r>
+          </a:p>
+        </p:txBody>
+      </p:sp>
+      <p:sp>
+        <p:nvSpPr>
+          <p:cNvPr id="9" name="ZoneTexte 8">
+            <a:extLst>
+              <a:ext uri="{FF2B5EF4-FFF2-40B4-BE49-F238E27FC236}">
+                <a16:creationId xmlns:a16="http://schemas.microsoft.com/office/drawing/2014/main" id="{CE0942FB-716E-15A7-648C-40680C6DEC38}"/>
+              </a:ext>
+            </a:extLst>
+          </p:cNvPr>
+          <p:cNvSpPr txBox="1"/>
+          <p:nvPr/>
+        </p:nvSpPr>
+        <p:spPr>
+          <a:xfrm>
+            <a:off x="3505594" y="4622052"/>
+            <a:ext cx="2389239" cy="338554"/>
+          </a:xfrm>
+          <a:prstGeom prst="rect">
+            <a:avLst/>
+          </a:prstGeom>
+          <a:solidFill>
+            <a:schemeClr val="tx2">
+              <a:lumMod val="10000"/>
+              <a:lumOff val="90000"/>
+            </a:schemeClr>
+          </a:solidFill>
+        </p:spPr>
+        <p:txBody>
+          <a:bodyPr wrap="square">
+            <a:spAutoFit/>
+          </a:bodyPr>
+          <a:lstStyle/>
+          <a:p>
+            <a:r>
+              <a:rPr lang="fr-FR" sz="1600" dirty="0"/>
+              <a:t>B1_s4_ex42_x_classes</a:t>
+            </a:r>
+          </a:p>
+        </p:txBody>
+      </p:sp>
     </p:spTree>
     <p:extLst>
       <p:ext uri="{BB962C8B-B14F-4D97-AF65-F5344CB8AC3E}">

</xml_diff>